<commit_message>
jhyau lagyo aba yei final
</commit_message>
<xml_diff>
--- a/Sudoku Solver.pptx
+++ b/Sudoku Solver.pptx
@@ -197,6 +197,7 @@
           <a:p>
             <a:fld id="{6B486042-7536-4A2D-A26A-7BBC7BAE881A}" type="datetimeFigureOut">
               <a:rPr lang="en-US" smtClean="0"/>
+              <a:pPr/>
               <a:t>2/25/2018</a:t>
             </a:fld>
             <a:endParaRPr lang="en-US"/>
@@ -358,6 +359,7 @@
           <a:p>
             <a:fld id="{5C1B8ECB-E553-49A6-AD7A-E1AD14712248}" type="slidenum">
               <a:rPr lang="en-US" smtClean="0"/>
+              <a:pPr/>
               <a:t>‹#›</a:t>
             </a:fld>
             <a:endParaRPr lang="en-US"/>
@@ -533,6 +535,7 @@
           <a:p>
             <a:fld id="{5C1B8ECB-E553-49A6-AD7A-E1AD14712248}" type="slidenum">
               <a:rPr lang="en-US" smtClean="0"/>
+              <a:pPr/>
               <a:t>3</a:t>
             </a:fld>
             <a:endParaRPr lang="en-US"/>
@@ -621,6 +624,7 @@
           <a:p>
             <a:fld id="{5C1B8ECB-E553-49A6-AD7A-E1AD14712248}" type="slidenum">
               <a:rPr lang="en-US" smtClean="0"/>
+              <a:pPr/>
               <a:t>4</a:t>
             </a:fld>
             <a:endParaRPr lang="en-US"/>
@@ -915,6 +919,7 @@
           <a:p>
             <a:fld id="{5E64D575-F8C7-4434-A9A7-C485AAFDFA7A}" type="datetimeFigureOut">
               <a:rPr lang="en-US" smtClean="0"/>
+              <a:pPr/>
               <a:t>2/25/2018</a:t>
             </a:fld>
             <a:endParaRPr lang="en-US"/>
@@ -1144,6 +1149,7 @@
           <a:p>
             <a:fld id="{704270E8-A7DA-42EF-A116-74136223323D}" type="slidenum">
               <a:rPr lang="en-US" smtClean="0"/>
+              <a:pPr/>
               <a:t>‹#›</a:t>
             </a:fld>
             <a:endParaRPr lang="en-US"/>
@@ -1308,6 +1314,7 @@
           <a:p>
             <a:fld id="{5E64D575-F8C7-4434-A9A7-C485AAFDFA7A}" type="datetimeFigureOut">
               <a:rPr lang="en-US" smtClean="0"/>
+              <a:pPr/>
               <a:t>2/25/2018</a:t>
             </a:fld>
             <a:endParaRPr lang="en-US"/>
@@ -1350,6 +1357,7 @@
           <a:p>
             <a:fld id="{704270E8-A7DA-42EF-A116-74136223323D}" type="slidenum">
               <a:rPr lang="en-US" smtClean="0"/>
+              <a:pPr/>
               <a:t>‹#›</a:t>
             </a:fld>
             <a:endParaRPr lang="en-US"/>
@@ -1760,6 +1768,7 @@
           <a:p>
             <a:fld id="{704270E8-A7DA-42EF-A116-74136223323D}" type="slidenum">
               <a:rPr lang="en-US" smtClean="0"/>
+              <a:pPr/>
               <a:t>‹#›</a:t>
             </a:fld>
             <a:endParaRPr lang="en-US"/>
@@ -1840,6 +1849,7 @@
           <a:p>
             <a:fld id="{5E64D575-F8C7-4434-A9A7-C485AAFDFA7A}" type="datetimeFigureOut">
               <a:rPr lang="en-US" smtClean="0"/>
+              <a:pPr/>
               <a:t>2/25/2018</a:t>
             </a:fld>
             <a:endParaRPr lang="en-US"/>
@@ -1973,6 +1983,7 @@
           <a:p>
             <a:fld id="{5E64D575-F8C7-4434-A9A7-C485AAFDFA7A}" type="datetimeFigureOut">
               <a:rPr lang="en-US" smtClean="0"/>
+              <a:pPr/>
               <a:t>2/25/2018</a:t>
             </a:fld>
             <a:endParaRPr lang="en-US"/>
@@ -2020,6 +2031,7 @@
           <a:p>
             <a:fld id="{704270E8-A7DA-42EF-A116-74136223323D}" type="slidenum">
               <a:rPr lang="en-US" smtClean="0"/>
+              <a:pPr/>
               <a:t>‹#›</a:t>
             </a:fld>
             <a:endParaRPr lang="en-US"/>
@@ -2516,6 +2528,7 @@
           <a:p>
             <a:fld id="{5E64D575-F8C7-4434-A9A7-C485AAFDFA7A}" type="datetimeFigureOut">
               <a:rPr lang="en-US" smtClean="0"/>
+              <a:pPr/>
               <a:t>2/25/2018</a:t>
             </a:fld>
             <a:endParaRPr lang="en-US"/>
@@ -2688,6 +2701,7 @@
           <a:p>
             <a:fld id="{704270E8-A7DA-42EF-A116-74136223323D}" type="slidenum">
               <a:rPr lang="en-US" smtClean="0"/>
+              <a:pPr/>
               <a:t>‹#›</a:t>
             </a:fld>
             <a:endParaRPr lang="en-US"/>
@@ -2811,6 +2825,7 @@
           <a:p>
             <a:fld id="{5E64D575-F8C7-4434-A9A7-C485AAFDFA7A}" type="datetimeFigureOut">
               <a:rPr lang="en-US" smtClean="0"/>
+              <a:pPr/>
               <a:t>2/25/2018</a:t>
             </a:fld>
             <a:endParaRPr lang="en-US"/>
@@ -2853,6 +2868,7 @@
           <a:p>
             <a:fld id="{704270E8-A7DA-42EF-A116-74136223323D}" type="slidenum">
               <a:rPr lang="en-US" smtClean="0"/>
+              <a:pPr/>
               <a:t>‹#›</a:t>
             </a:fld>
             <a:endParaRPr lang="en-US"/>
@@ -3470,6 +3486,7 @@
           <a:p>
             <a:fld id="{5E64D575-F8C7-4434-A9A7-C485AAFDFA7A}" type="datetimeFigureOut">
               <a:rPr lang="en-US" smtClean="0"/>
+              <a:pPr/>
               <a:t>2/25/2018</a:t>
             </a:fld>
             <a:endParaRPr lang="en-US"/>
@@ -3812,6 +3829,7 @@
           <a:p>
             <a:fld id="{704270E8-A7DA-42EF-A116-74136223323D}" type="slidenum">
               <a:rPr lang="en-US" smtClean="0"/>
+              <a:pPr/>
               <a:t>‹#›</a:t>
             </a:fld>
             <a:endParaRPr lang="en-US"/>
@@ -3906,6 +3924,7 @@
           <a:p>
             <a:fld id="{5E64D575-F8C7-4434-A9A7-C485AAFDFA7A}" type="datetimeFigureOut">
               <a:rPr lang="en-US" smtClean="0"/>
+              <a:pPr/>
               <a:t>2/25/2018</a:t>
             </a:fld>
             <a:endParaRPr lang="en-US"/>
@@ -3953,6 +3972,7 @@
           <a:p>
             <a:fld id="{704270E8-A7DA-42EF-A116-74136223323D}" type="slidenum">
               <a:rPr lang="en-US" smtClean="0"/>
+              <a:pPr/>
               <a:t>‹#›</a:t>
             </a:fld>
             <a:endParaRPr lang="en-US"/>
@@ -4219,6 +4239,7 @@
           <a:p>
             <a:fld id="{5E64D575-F8C7-4434-A9A7-C485AAFDFA7A}" type="datetimeFigureOut">
               <a:rPr lang="en-US" smtClean="0"/>
+              <a:pPr/>
               <a:t>2/25/2018</a:t>
             </a:fld>
             <a:endParaRPr lang="en-US"/>
@@ -4274,6 +4295,7 @@
           <a:p>
             <a:fld id="{704270E8-A7DA-42EF-A116-74136223323D}" type="slidenum">
               <a:rPr lang="en-US" smtClean="0"/>
+              <a:pPr/>
               <a:t>‹#›</a:t>
             </a:fld>
             <a:endParaRPr lang="en-US"/>
@@ -4892,6 +4914,7 @@
           <a:p>
             <a:fld id="{704270E8-A7DA-42EF-A116-74136223323D}" type="slidenum">
               <a:rPr lang="en-US" smtClean="0"/>
+              <a:pPr/>
               <a:t>‹#›</a:t>
             </a:fld>
             <a:endParaRPr lang="en-US"/>
@@ -4951,6 +4974,7 @@
           <a:p>
             <a:fld id="{5E64D575-F8C7-4434-A9A7-C485AAFDFA7A}" type="datetimeFigureOut">
               <a:rPr lang="en-US" smtClean="0"/>
+              <a:pPr/>
               <a:t>2/25/2018</a:t>
             </a:fld>
             <a:endParaRPr lang="en-US"/>
@@ -5426,6 +5450,7 @@
           <a:p>
             <a:fld id="{704270E8-A7DA-42EF-A116-74136223323D}" type="slidenum">
               <a:rPr lang="en-US" smtClean="0"/>
+              <a:pPr/>
               <a:t>‹#›</a:t>
             </a:fld>
             <a:endParaRPr lang="en-US"/>
@@ -5615,6 +5640,7 @@
           <a:p>
             <a:fld id="{5E64D575-F8C7-4434-A9A7-C485AAFDFA7A}" type="datetimeFigureOut">
               <a:rPr lang="en-US" smtClean="0"/>
+              <a:pPr/>
               <a:t>2/25/2018</a:t>
             </a:fld>
             <a:endParaRPr lang="en-US"/>
@@ -5888,6 +5914,7 @@
           <a:p>
             <a:fld id="{5E64D575-F8C7-4434-A9A7-C485AAFDFA7A}" type="datetimeFigureOut">
               <a:rPr lang="en-US" smtClean="0"/>
+              <a:pPr/>
               <a:t>2/25/2018</a:t>
             </a:fld>
             <a:endParaRPr lang="en-US"/>
@@ -6138,6 +6165,7 @@
           <a:p>
             <a:fld id="{704270E8-A7DA-42EF-A116-74136223323D}" type="slidenum">
               <a:rPr lang="en-US" smtClean="0"/>
+              <a:pPr/>
               <a:t>‹#›</a:t>
             </a:fld>
             <a:endParaRPr lang="en-US"/>
@@ -6571,7 +6599,12 @@
             <p:ph type="subTitle" idx="1"/>
           </p:nvPr>
         </p:nvSpPr>
-        <p:spPr/>
+        <p:spPr>
+          <a:xfrm>
+            <a:off x="785786" y="2819400"/>
+            <a:ext cx="7500990" cy="2967054"/>
+          </a:xfrm>
+        </p:spPr>
         <p:txBody>
           <a:bodyPr/>
           <a:lstStyle/>
@@ -6592,8 +6625,50 @@
             </a:br>
             <a:r>
               <a:rPr lang="en-US" dirty="0" smtClean="0"/>
-              <a:t> -Bibek Kaliraj(074BCT510)</a:t>
-            </a:r>
+              <a:t> -Bibek Kaliraj(074BCT510</a:t>
+            </a:r>
+            <a:r>
+              <a:rPr lang="en-US" dirty="0" smtClean="0"/>
+              <a:t>)</a:t>
+            </a:r>
+            <a:br>
+              <a:rPr lang="en-US" dirty="0" smtClean="0"/>
+            </a:br>
+            <a:r>
+              <a:rPr lang="en-US" dirty="0" smtClean="0"/>
+              <a:t/>
+            </a:r>
+            <a:br>
+              <a:rPr lang="en-US" dirty="0" smtClean="0"/>
+            </a:br>
+            <a:r>
+              <a:rPr lang="en-US" dirty="0" smtClean="0"/>
+              <a:t>SUBMITTED TO:</a:t>
+            </a:r>
+            <a:br>
+              <a:rPr lang="en-US" dirty="0" smtClean="0"/>
+            </a:br>
+            <a:r>
+              <a:rPr lang="en-US" dirty="0" smtClean="0"/>
+              <a:t>DEPARTMENT OF ELECTRONICS</a:t>
+            </a:r>
+            <a:br>
+              <a:rPr lang="en-US" dirty="0" smtClean="0"/>
+            </a:br>
+            <a:r>
+              <a:rPr lang="en-US" dirty="0" smtClean="0"/>
+              <a:t>And </a:t>
+            </a:r>
+            <a:br>
+              <a:rPr lang="en-US" dirty="0" smtClean="0"/>
+            </a:br>
+            <a:r>
+              <a:rPr lang="en-US" dirty="0" smtClean="0"/>
+              <a:t>COMPUTER ENGINEERING</a:t>
+            </a:r>
+            <a:br>
+              <a:rPr lang="en-US" dirty="0" smtClean="0"/>
+            </a:br>
             <a:endParaRPr lang="en-US" dirty="0"/>
           </a:p>
         </p:txBody>

</xml_diff>